<commit_message>
Update deep learning hands-on
</commit_message>
<xml_diff>
--- a/20211208_deep_learning_handson/deep_learning_handson.pptx
+++ b/20211208_deep_learning_handson/deep_learning_handson.pptx
@@ -7348,7 +7348,15 @@
           <a:p>
             <a:r>
               <a:rPr lang="en-US" dirty="0"/>
-              <a:t>Python libraries: NumPy, SciPy, Matplotlib, etc.</a:t>
+              <a:t>Python libraries: NumPy, SciPy, Matplotlib, </a:t>
+            </a:r>
+            <a:r>
+              <a:rPr lang="en-US" dirty="0" err="1"/>
+              <a:t>DeepXDE</a:t>
+            </a:r>
+            <a:r>
+              <a:rPr lang="en-US" dirty="0"/>
+              <a:t>, etc.</a:t>
             </a:r>
           </a:p>
           <a:p>
@@ -8358,7 +8366,7 @@
           <a:p>
             <a:r>
               <a:rPr lang="en-US" dirty="0"/>
-              <a:t>Monitoring GPU status</a:t>
+              <a:t>Monitor GPU status</a:t>
             </a:r>
           </a:p>
           <a:p>

</xml_diff>

<commit_message>
Update deep learning handson
</commit_message>
<xml_diff>
--- a/20211208_deep_learning_handson/deep_learning_handson.pptx
+++ b/20211208_deep_learning_handson/deep_learning_handson.pptx
@@ -6,7 +6,7 @@
     <p:sldMasterId id="2147483660" r:id="rId2"/>
   </p:sldMasterIdLst>
   <p:notesMasterIdLst>
-    <p:notesMasterId r:id="rId12"/>
+    <p:notesMasterId r:id="rId13"/>
   </p:notesMasterIdLst>
   <p:sldIdLst>
     <p:sldId id="256" r:id="rId3"/>
@@ -16,8 +16,9 @@
     <p:sldId id="960" r:id="rId7"/>
     <p:sldId id="965" r:id="rId8"/>
     <p:sldId id="961" r:id="rId9"/>
-    <p:sldId id="962" r:id="rId10"/>
-    <p:sldId id="963" r:id="rId11"/>
+    <p:sldId id="966" r:id="rId10"/>
+    <p:sldId id="962" r:id="rId11"/>
+    <p:sldId id="963" r:id="rId12"/>
   </p:sldIdLst>
   <p:sldSz cx="12192000" cy="6858000"/>
   <p:notesSz cx="6858000" cy="9144000"/>
@@ -206,7 +207,7 @@
           <a:p>
             <a:fld id="{E0FF7D46-1BDA-4562-93AF-7CBABB228BAD}" type="datetimeFigureOut">
               <a:rPr lang="en-US" smtClean="0"/>
-              <a:t>12/7/2021</a:t>
+              <a:t>12/9/2021</a:t>
             </a:fld>
             <a:endParaRPr lang="en-US"/>
           </a:p>
@@ -620,7 +621,7 @@
           <a:p>
             <a:fld id="{360E1188-9171-486E-B7D7-D68ADD6A5F5A}" type="datetimeFigureOut">
               <a:rPr lang="en-US" smtClean="0"/>
-              <a:t>12/7/2021</a:t>
+              <a:t>12/9/2021</a:t>
             </a:fld>
             <a:endParaRPr lang="en-US"/>
           </a:p>
@@ -818,7 +819,7 @@
           <a:p>
             <a:fld id="{360E1188-9171-486E-B7D7-D68ADD6A5F5A}" type="datetimeFigureOut">
               <a:rPr lang="en-US" smtClean="0"/>
-              <a:t>12/7/2021</a:t>
+              <a:t>12/9/2021</a:t>
             </a:fld>
             <a:endParaRPr lang="en-US"/>
           </a:p>
@@ -1026,7 +1027,7 @@
           <a:p>
             <a:fld id="{360E1188-9171-486E-B7D7-D68ADD6A5F5A}" type="datetimeFigureOut">
               <a:rPr lang="en-US" smtClean="0"/>
-              <a:t>12/7/2021</a:t>
+              <a:t>12/9/2021</a:t>
             </a:fld>
             <a:endParaRPr lang="en-US"/>
           </a:p>
@@ -3095,7 +3096,7 @@
           <a:p>
             <a:fld id="{0EE2469E-5970-A944-A0C5-7F26DB491F3D}" type="datetime1">
               <a:rPr lang="en-US" smtClean="0"/>
-              <a:t>12/7/2021</a:t>
+              <a:t>12/9/2021</a:t>
             </a:fld>
             <a:endParaRPr lang="en-US" dirty="0"/>
           </a:p>
@@ -3232,7 +3233,7 @@
           <a:p>
             <a:fld id="{43D3A063-0686-D747-81E9-62015CE3A3B7}" type="datetime1">
               <a:rPr lang="en-US" smtClean="0"/>
-              <a:t>12/7/2021</a:t>
+              <a:t>12/9/2021</a:t>
             </a:fld>
             <a:endParaRPr lang="en-US"/>
           </a:p>
@@ -3446,7 +3447,7 @@
           <a:p>
             <a:fld id="{360E1188-9171-486E-B7D7-D68ADD6A5F5A}" type="datetimeFigureOut">
               <a:rPr lang="en-US" smtClean="0"/>
-              <a:t>12/7/2021</a:t>
+              <a:t>12/9/2021</a:t>
             </a:fld>
             <a:endParaRPr lang="en-US"/>
           </a:p>
@@ -3708,7 +3709,7 @@
             <a:fld id="{09514CEE-D7C2-42CF-BE1C-8E9D9569E4CE}" type="datetime1">
               <a:rPr lang="en-US"/>
               <a:pPr/>
-              <a:t>12/7/2021</a:t>
+              <a:t>12/9/2021</a:t>
             </a:fld>
             <a:endParaRPr lang="en-US"/>
           </a:p>
@@ -3986,7 +3987,7 @@
           <a:p>
             <a:fld id="{360E1188-9171-486E-B7D7-D68ADD6A5F5A}" type="datetimeFigureOut">
               <a:rPr lang="en-US" smtClean="0"/>
-              <a:t>12/7/2021</a:t>
+              <a:t>12/9/2021</a:t>
             </a:fld>
             <a:endParaRPr lang="en-US"/>
           </a:p>
@@ -4251,7 +4252,7 @@
           <a:p>
             <a:fld id="{360E1188-9171-486E-B7D7-D68ADD6A5F5A}" type="datetimeFigureOut">
               <a:rPr lang="en-US" smtClean="0"/>
-              <a:t>12/7/2021</a:t>
+              <a:t>12/9/2021</a:t>
             </a:fld>
             <a:endParaRPr lang="en-US"/>
           </a:p>
@@ -4663,7 +4664,7 @@
           <a:p>
             <a:fld id="{360E1188-9171-486E-B7D7-D68ADD6A5F5A}" type="datetimeFigureOut">
               <a:rPr lang="en-US" smtClean="0"/>
-              <a:t>12/7/2021</a:t>
+              <a:t>12/9/2021</a:t>
             </a:fld>
             <a:endParaRPr lang="en-US"/>
           </a:p>
@@ -4804,7 +4805,7 @@
           <a:p>
             <a:fld id="{360E1188-9171-486E-B7D7-D68ADD6A5F5A}" type="datetimeFigureOut">
               <a:rPr lang="en-US" smtClean="0"/>
-              <a:t>12/7/2021</a:t>
+              <a:t>12/9/2021</a:t>
             </a:fld>
             <a:endParaRPr lang="en-US"/>
           </a:p>
@@ -4917,7 +4918,7 @@
           <a:p>
             <a:fld id="{360E1188-9171-486E-B7D7-D68ADD6A5F5A}" type="datetimeFigureOut">
               <a:rPr lang="en-US" smtClean="0"/>
-              <a:t>12/7/2021</a:t>
+              <a:t>12/9/2021</a:t>
             </a:fld>
             <a:endParaRPr lang="en-US"/>
           </a:p>
@@ -5228,7 +5229,7 @@
           <a:p>
             <a:fld id="{360E1188-9171-486E-B7D7-D68ADD6A5F5A}" type="datetimeFigureOut">
               <a:rPr lang="en-US" smtClean="0"/>
-              <a:t>12/7/2021</a:t>
+              <a:t>12/9/2021</a:t>
             </a:fld>
             <a:endParaRPr lang="en-US"/>
           </a:p>
@@ -5516,7 +5517,7 @@
           <a:p>
             <a:fld id="{360E1188-9171-486E-B7D7-D68ADD6A5F5A}" type="datetimeFigureOut">
               <a:rPr lang="en-US" smtClean="0"/>
-              <a:t>12/7/2021</a:t>
+              <a:t>12/9/2021</a:t>
             </a:fld>
             <a:endParaRPr lang="en-US"/>
           </a:p>
@@ -5757,7 +5758,7 @@
           <a:p>
             <a:fld id="{360E1188-9171-486E-B7D7-D68ADD6A5F5A}" type="datetimeFigureOut">
               <a:rPr lang="en-US" smtClean="0"/>
-              <a:t>12/7/2021</a:t>
+              <a:t>12/9/2021</a:t>
             </a:fld>
             <a:endParaRPr lang="en-US"/>
           </a:p>
@@ -7270,6 +7271,99 @@
 </p:sld>
 </file>
 
+<file path=ppt/slides/slide10.xml><?xml version="1.0" encoding="utf-8"?>
+<p:sld xmlns:a="http://schemas.openxmlformats.org/drawingml/2006/main" xmlns:r="http://schemas.openxmlformats.org/officeDocument/2006/relationships" xmlns:p="http://schemas.openxmlformats.org/presentationml/2006/main">
+  <p:cSld>
+    <p:spTree>
+      <p:nvGrpSpPr>
+        <p:cNvPr id="1" name=""/>
+        <p:cNvGrpSpPr/>
+        <p:nvPr/>
+      </p:nvGrpSpPr>
+      <p:grpSpPr>
+        <a:xfrm>
+          <a:off x="0" y="0"/>
+          <a:ext cx="0" cy="0"/>
+          <a:chOff x="0" y="0"/>
+          <a:chExt cx="0" cy="0"/>
+        </a:xfrm>
+      </p:grpSpPr>
+      <p:sp>
+        <p:nvSpPr>
+          <p:cNvPr id="2" name="Title 1">
+            <a:extLst>
+              <a:ext uri="{FF2B5EF4-FFF2-40B4-BE49-F238E27FC236}">
+                <a16:creationId xmlns:a16="http://schemas.microsoft.com/office/drawing/2014/main" id="{FA0C7A2C-0F44-4958-AD32-931C77D53720}"/>
+              </a:ext>
+            </a:extLst>
+          </p:cNvPr>
+          <p:cNvSpPr>
+            <a:spLocks noGrp="1"/>
+          </p:cNvSpPr>
+          <p:nvPr>
+            <p:ph type="title"/>
+          </p:nvPr>
+        </p:nvSpPr>
+        <p:spPr/>
+        <p:txBody>
+          <a:bodyPr/>
+          <a:lstStyle/>
+          <a:p>
+            <a:r>
+              <a:rPr lang="en-US" dirty="0"/>
+              <a:t>Hands-on</a:t>
+            </a:r>
+          </a:p>
+        </p:txBody>
+      </p:sp>
+      <p:pic>
+        <p:nvPicPr>
+          <p:cNvPr id="5" name="Content Placeholder 4" descr="A person doing a handstand on a computer&#10;&#10;Description automatically generated with medium confidence">
+            <a:extLst>
+              <a:ext uri="{FF2B5EF4-FFF2-40B4-BE49-F238E27FC236}">
+                <a16:creationId xmlns:a16="http://schemas.microsoft.com/office/drawing/2014/main" id="{808DA348-C9F8-4F9A-A0C9-37116230038E}"/>
+              </a:ext>
+            </a:extLst>
+          </p:cNvPr>
+          <p:cNvPicPr>
+            <a:picLocks noGrp="1" noChangeAspect="1"/>
+          </p:cNvPicPr>
+          <p:nvPr>
+            <p:ph idx="1"/>
+          </p:nvPr>
+        </p:nvPicPr>
+        <p:blipFill>
+          <a:blip r:embed="rId2">
+            <a:extLst>
+              <a:ext uri="{28A0092B-C50C-407E-A947-70E740481C1C}">
+                <a14:useLocalDpi xmlns:a14="http://schemas.microsoft.com/office/drawing/2010/main" val="0"/>
+              </a:ext>
+            </a:extLst>
+          </a:blip>
+          <a:stretch>
+            <a:fillRect/>
+          </a:stretch>
+        </p:blipFill>
+        <p:spPr>
+          <a:xfrm>
+            <a:off x="1264509" y="1278451"/>
+            <a:ext cx="9662983" cy="5448010"/>
+          </a:xfrm>
+        </p:spPr>
+      </p:pic>
+    </p:spTree>
+    <p:extLst>
+      <p:ext uri="{BB962C8B-B14F-4D97-AF65-F5344CB8AC3E}">
+        <p14:creationId xmlns:p14="http://schemas.microsoft.com/office/powerpoint/2010/main" val="272380241"/>
+      </p:ext>
+    </p:extLst>
+  </p:cSld>
+  <p:clrMapOvr>
+    <a:masterClrMapping/>
+  </p:clrMapOvr>
+</p:sld>
+</file>
+
 <file path=ppt/slides/slide2.xml><?xml version="1.0" encoding="utf-8"?>
 <p:sld xmlns:a="http://schemas.openxmlformats.org/drawingml/2006/main" xmlns:r="http://schemas.openxmlformats.org/officeDocument/2006/relationships" xmlns:p="http://schemas.openxmlformats.org/presentationml/2006/main">
   <p:cSld>
@@ -8471,20 +8565,101 @@
           <a:chExt cx="0" cy="0"/>
         </a:xfrm>
       </p:grpSpPr>
-      <p:sp>
-        <p:nvSpPr>
-          <p:cNvPr id="2" name="Title 1">
-            <a:extLst>
-              <a:ext uri="{FF2B5EF4-FFF2-40B4-BE49-F238E27FC236}">
-                <a16:creationId xmlns:a16="http://schemas.microsoft.com/office/drawing/2014/main" id="{61D27675-C2B5-42E7-B528-03FA8E2487B7}"/>
-              </a:ext>
-            </a:extLst>
-          </p:cNvPr>
-          <p:cNvSpPr>
-            <a:spLocks noGrp="1"/>
-          </p:cNvSpPr>
-          <p:nvPr>
-            <p:ph type="title"/>
+      <mc:AlternateContent xmlns:mc="http://schemas.openxmlformats.org/markup-compatibility/2006">
+        <mc:Choice xmlns:a14="http://schemas.microsoft.com/office/drawing/2010/main" Requires="a14">
+          <p:sp>
+            <p:nvSpPr>
+              <p:cNvPr id="2" name="Title 1">
+                <a:extLst>
+                  <a:ext uri="{FF2B5EF4-FFF2-40B4-BE49-F238E27FC236}">
+                    <a16:creationId xmlns:a16="http://schemas.microsoft.com/office/drawing/2014/main" id="{3FB9CB0D-9445-4378-875F-088CCC3ADB03}"/>
+                  </a:ext>
+                </a:extLst>
+              </p:cNvPr>
+              <p:cNvSpPr>
+                <a:spLocks noGrp="1"/>
+              </p:cNvSpPr>
+              <p:nvPr>
+                <p:ph type="title"/>
+              </p:nvPr>
+            </p:nvSpPr>
+            <p:spPr/>
+            <p:txBody>
+              <a:bodyPr/>
+              <a:lstStyle/>
+              <a:p>
+                <a14:m>
+                  <m:oMath xmlns:m="http://schemas.openxmlformats.org/officeDocument/2006/math">
+                    <m:r>
+                      <a:rPr lang="en-US" b="0" i="1" smtClean="0">
+                        <a:latin typeface="Cambria Math" panose="02040503050406030204" pitchFamily="18" charset="0"/>
+                      </a:rPr>
+                      <m:t>∑∑</m:t>
+                    </m:r>
+                  </m:oMath>
+                </a14:m>
+                <a:r>
+                  <a:rPr lang="en-US" baseline="-25000" dirty="0"/>
+                  <a:t>Job</a:t>
+                </a:r>
+              </a:p>
+            </p:txBody>
+          </p:sp>
+        </mc:Choice>
+        <mc:Fallback>
+          <p:sp>
+            <p:nvSpPr>
+              <p:cNvPr id="2" name="Title 1">
+                <a:extLst>
+                  <a:ext uri="{FF2B5EF4-FFF2-40B4-BE49-F238E27FC236}">
+                    <a16:creationId xmlns:a16="http://schemas.microsoft.com/office/drawing/2014/main" id="{3FB9CB0D-9445-4378-875F-088CCC3ADB03}"/>
+                  </a:ext>
+                </a:extLst>
+              </p:cNvPr>
+              <p:cNvSpPr>
+                <a:spLocks noGrp="1" noRot="1" noChangeAspect="1" noMove="1" noResize="1" noEditPoints="1" noAdjustHandles="1" noChangeArrowheads="1" noChangeShapeType="1" noTextEdit="1"/>
+              </p:cNvSpPr>
+              <p:nvPr>
+                <p:ph type="title"/>
+              </p:nvPr>
+            </p:nvSpPr>
+            <p:spPr>
+              <a:blipFill>
+                <a:blip r:embed="rId2"/>
+                <a:stretch>
+                  <a:fillRect/>
+                </a:stretch>
+              </a:blipFill>
+            </p:spPr>
+            <p:txBody>
+              <a:bodyPr/>
+              <a:lstStyle/>
+              <a:p>
+                <a:r>
+                  <a:rPr lang="en-US">
+                    <a:noFill/>
+                  </a:rPr>
+                  <a:t> </a:t>
+                </a:r>
+              </a:p>
+            </p:txBody>
+          </p:sp>
+        </mc:Fallback>
+      </mc:AlternateContent>
+      <p:sp>
+        <p:nvSpPr>
+          <p:cNvPr id="3" name="Content Placeholder 2">
+            <a:extLst>
+              <a:ext uri="{FF2B5EF4-FFF2-40B4-BE49-F238E27FC236}">
+                <a16:creationId xmlns:a16="http://schemas.microsoft.com/office/drawing/2014/main" id="{458BEDBB-6A00-41BA-9F01-15E60E8148A5}"/>
+              </a:ext>
+            </a:extLst>
+          </p:cNvPr>
+          <p:cNvSpPr>
+            <a:spLocks noGrp="1"/>
+          </p:cNvSpPr>
+          <p:nvPr>
+            <p:ph idx="1"/>
           </p:nvPr>
         </p:nvSpPr>
         <p:spPr/>
@@ -8493,50 +8668,96 @@
           <a:lstStyle/>
           <a:p>
             <a:r>
+              <a:rPr lang="en-US" dirty="0" err="1"/>
+              <a:t>ΣΣ</a:t>
+            </a:r>
+            <a:r>
+              <a:rPr lang="en-US" baseline="-25000" dirty="0" err="1"/>
+              <a:t>Job</a:t>
+            </a:r>
+            <a:r>
               <a:rPr lang="en-US" dirty="0"/>
-              <a:t>Training loop</a:t>
-            </a:r>
-          </a:p>
-        </p:txBody>
-      </p:sp>
-      <p:pic>
-        <p:nvPicPr>
-          <p:cNvPr id="5" name="Content Placeholder 4" descr="Diagram&#10;&#10;Description automatically generated">
-            <a:extLst>
-              <a:ext uri="{FF2B5EF4-FFF2-40B4-BE49-F238E27FC236}">
-                <a16:creationId xmlns:a16="http://schemas.microsoft.com/office/drawing/2014/main" id="{AFC409E1-A1BE-41F6-99A3-4DABA3213F6C}"/>
-              </a:ext>
-            </a:extLst>
-          </p:cNvPr>
-          <p:cNvPicPr>
-            <a:picLocks noGrp="1" noChangeAspect="1"/>
-          </p:cNvPicPr>
-          <p:nvPr>
-            <p:ph idx="1"/>
-          </p:nvPr>
-        </p:nvPicPr>
-        <p:blipFill rotWithShape="1">
-          <a:blip r:embed="rId2">
-            <a:extLst>
-              <a:ext uri="{28A0092B-C50C-407E-A947-70E740481C1C}">
-                <a14:useLocalDpi xmlns:a14="http://schemas.microsoft.com/office/drawing/2010/main" val="0"/>
-              </a:ext>
-            </a:extLst>
-          </a:blip>
-          <a:srcRect t="24874"/>
-          <a:stretch/>
-        </p:blipFill>
-        <p:spPr>
-          <a:xfrm>
-            <a:off x="256532" y="2032685"/>
-            <a:ext cx="11678936" cy="3521676"/>
-          </a:xfrm>
-        </p:spPr>
-      </p:pic>
+              <a:t> or </a:t>
+            </a:r>
+            <a:r>
+              <a:rPr lang="en-US" dirty="0" err="1"/>
+              <a:t>Sums</a:t>
+            </a:r>
+            <a:r>
+              <a:rPr lang="en-US" baseline="-25000" dirty="0" err="1"/>
+              <a:t>Job</a:t>
+            </a:r>
+            <a:r>
+              <a:rPr lang="en-US" dirty="0"/>
+              <a:t> (</a:t>
+            </a:r>
+            <a:r>
+              <a:rPr lang="en-US" b="1" dirty="0"/>
+              <a:t>S</a:t>
+            </a:r>
+            <a:r>
+              <a:rPr lang="en-US" dirty="0"/>
+              <a:t>imple </a:t>
+            </a:r>
+            <a:r>
+              <a:rPr lang="en-US" b="1" dirty="0"/>
+              <a:t>U</a:t>
+            </a:r>
+            <a:r>
+              <a:rPr lang="en-US" dirty="0"/>
+              <a:t>tility for </a:t>
+            </a:r>
+            <a:r>
+              <a:rPr lang="en-US" b="1" dirty="0"/>
+              <a:t>M</a:t>
+            </a:r>
+            <a:r>
+              <a:rPr lang="en-US" dirty="0"/>
+              <a:t>ultiple-</a:t>
+            </a:r>
+            <a:r>
+              <a:rPr lang="en-US" b="1" dirty="0"/>
+              <a:t>S</a:t>
+            </a:r>
+            <a:r>
+              <a:rPr lang="en-US" dirty="0"/>
+              <a:t>ervers </a:t>
+            </a:r>
+            <a:r>
+              <a:rPr lang="en-US" b="1" dirty="0"/>
+              <a:t>J</a:t>
+            </a:r>
+            <a:r>
+              <a:rPr lang="en-US" dirty="0"/>
+              <a:t>ob </a:t>
+            </a:r>
+            <a:r>
+              <a:rPr lang="en-US" b="1" dirty="0"/>
+              <a:t>Sub</a:t>
+            </a:r>
+            <a:r>
+              <a:rPr lang="en-US" dirty="0"/>
+              <a:t>mission) is a simple Linux command-line utility which submits a job to one of the multiple servers each with limited resources.</a:t>
+            </a:r>
+          </a:p>
+          <a:p>
+            <a:r>
+              <a:rPr lang="en-US" dirty="0">
+                <a:hlinkClick r:id="rId3"/>
+              </a:rPr>
+              <a:t>https://github.com/lululxvi/sumsjob</a:t>
+            </a:r>
+            <a:r>
+              <a:rPr lang="en-US" dirty="0"/>
+              <a:t> </a:t>
+            </a:r>
+          </a:p>
+        </p:txBody>
+      </p:sp>
     </p:spTree>
     <p:extLst>
       <p:ext uri="{BB962C8B-B14F-4D97-AF65-F5344CB8AC3E}">
-        <p14:creationId xmlns:p14="http://schemas.microsoft.com/office/powerpoint/2010/main" val="659135755"/>
+        <p14:creationId xmlns:p14="http://schemas.microsoft.com/office/powerpoint/2010/main" val="2540447895"/>
       </p:ext>
     </p:extLst>
   </p:cSld>
@@ -8568,7 +8789,7 @@
           <p:cNvPr id="2" name="Title 1">
             <a:extLst>
               <a:ext uri="{FF2B5EF4-FFF2-40B4-BE49-F238E27FC236}">
-                <a16:creationId xmlns:a16="http://schemas.microsoft.com/office/drawing/2014/main" id="{FA0C7A2C-0F44-4958-AD32-931C77D53720}"/>
+                <a16:creationId xmlns:a16="http://schemas.microsoft.com/office/drawing/2014/main" id="{61D27675-C2B5-42E7-B528-03FA8E2487B7}"/>
               </a:ext>
             </a:extLst>
           </p:cNvPr>
@@ -8586,17 +8807,17 @@
           <a:p>
             <a:r>
               <a:rPr lang="en-US" dirty="0"/>
-              <a:t>Hands-on</a:t>
+              <a:t>Training loop</a:t>
             </a:r>
           </a:p>
         </p:txBody>
       </p:sp>
       <p:pic>
         <p:nvPicPr>
-          <p:cNvPr id="5" name="Content Placeholder 4" descr="A person doing a handstand on a computer&#10;&#10;Description automatically generated with medium confidence">
-            <a:extLst>
-              <a:ext uri="{FF2B5EF4-FFF2-40B4-BE49-F238E27FC236}">
-                <a16:creationId xmlns:a16="http://schemas.microsoft.com/office/drawing/2014/main" id="{808DA348-C9F8-4F9A-A0C9-37116230038E}"/>
+          <p:cNvPr id="5" name="Content Placeholder 4" descr="Diagram&#10;&#10;Description automatically generated">
+            <a:extLst>
+              <a:ext uri="{FF2B5EF4-FFF2-40B4-BE49-F238E27FC236}">
+                <a16:creationId xmlns:a16="http://schemas.microsoft.com/office/drawing/2014/main" id="{AFC409E1-A1BE-41F6-99A3-4DABA3213F6C}"/>
               </a:ext>
             </a:extLst>
           </p:cNvPr>
@@ -8607,7 +8828,7 @@
             <p:ph idx="1"/>
           </p:nvPr>
         </p:nvPicPr>
-        <p:blipFill>
+        <p:blipFill rotWithShape="1">
           <a:blip r:embed="rId2">
             <a:extLst>
               <a:ext uri="{28A0092B-C50C-407E-A947-70E740481C1C}">
@@ -8615,21 +8836,20 @@
               </a:ext>
             </a:extLst>
           </a:blip>
-          <a:stretch>
-            <a:fillRect/>
-          </a:stretch>
+          <a:srcRect t="24874"/>
+          <a:stretch/>
         </p:blipFill>
         <p:spPr>
           <a:xfrm>
-            <a:off x="1264509" y="1278451"/>
-            <a:ext cx="9662983" cy="5448010"/>
+            <a:off x="256532" y="2032685"/>
+            <a:ext cx="11678936" cy="3521676"/>
           </a:xfrm>
         </p:spPr>
       </p:pic>
     </p:spTree>
     <p:extLst>
       <p:ext uri="{BB962C8B-B14F-4D97-AF65-F5344CB8AC3E}">
-        <p14:creationId xmlns:p14="http://schemas.microsoft.com/office/powerpoint/2010/main" val="272380241"/>
+        <p14:creationId xmlns:p14="http://schemas.microsoft.com/office/powerpoint/2010/main" val="659135755"/>
       </p:ext>
     </p:extLst>
   </p:cSld>

</xml_diff>